<commit_message>
Updated project 1 note in lecture 5
</commit_message>
<xml_diff>
--- a/lectures/05-Tools.pptx
+++ b/lectures/05-Tools.pptx
@@ -154,7 +154,7 @@
     <p1510:client id="{11F9A79D-9168-449D-AFF9-F4C19F20F85D}" v="361" dt="2022-06-30T03:27:16.232"/>
     <p1510:client id="{1439D8FB-9875-49D2-B3F4-E7419B34FFE9}" v="19" dt="2022-06-30T23:10:08.314"/>
     <p1510:client id="{3404F8A3-0B58-42A0-923D-6B0EBA07FCB3}" v="6231" dt="2022-08-10T12:52:47.373"/>
-    <p1510:client id="{8B5A1CB7-C378-4BBD-997F-6AB4A6A885D8}" v="1520" dt="2022-09-07T20:20:02.727"/>
+    <p1510:client id="{8B5A1CB7-C378-4BBD-997F-6AB4A6A885D8}" v="1617" dt="2022-09-07T20:27:47.050"/>
     <p1510:client id="{B2839369-460F-48F2-993D-C728E02833F2}" v="3943" dt="2022-09-07T19:44:39.006"/>
     <p1510:client id="{B6F34E9E-AB5E-4F78-96B5-B1AA48F46F34}" v="4" dt="2022-08-19T00:56:27.227"/>
     <p1510:client id="{CAD5526C-1133-4F9B-8CF7-A05E173513B2}" v="32" dt="2022-06-30T18:57:13.086"/>
@@ -4976,7 +4976,7 @@
         <p:spPr>
           <a:xfrm>
             <a:off x="838200" y="1825625"/>
-            <a:ext cx="10515600" cy="4546722"/>
+            <a:ext cx="10515600" cy="5035183"/>
           </a:xfrm>
         </p:spPr>
         <p:txBody>
@@ -5044,7 +5044,14 @@
                 <a:ea typeface="Calibri"/>
                 <a:cs typeface="Calibri"/>
               </a:rPr>
-              <a:t> submissions are open for project 1, GitHub username, and project 2 (first group project) teams</a:t>
+              <a:t> submissions are open for project 1, GitHub username, and project 2 (first group project) teams. </a:t>
+            </a:r>
+            <a:r>
+              <a:rPr lang="en-US" b="1" dirty="0">
+                <a:ea typeface="Calibri"/>
+                <a:cs typeface="Calibri"/>
+              </a:rPr>
+              <a:t>Include job descriptions and GitHub link + summary of contents in submission.</a:t>
             </a:r>
           </a:p>
           <a:p>
@@ -5054,7 +5061,10 @@
               </a:rPr>
               <a:t>Project 1 – What can go in a portfolio?</a:t>
             </a:r>
-            <a:endParaRPr lang="en-US" dirty="0"/>
+            <a:endParaRPr lang="en-US" dirty="0">
+              <a:ea typeface="Calibri"/>
+              <a:cs typeface="Calibri"/>
+            </a:endParaRPr>
           </a:p>
           <a:p>
             <a:pPr lvl="1"/>
@@ -6549,10 +6559,15 @@
             <p:ph idx="1"/>
           </p:nvPr>
         </p:nvSpPr>
-        <p:spPr/>
+        <p:spPr>
+          <a:xfrm>
+            <a:off x="838200" y="1825625"/>
+            <a:ext cx="10515600" cy="5035184"/>
+          </a:xfrm>
+        </p:spPr>
         <p:txBody>
           <a:bodyPr vert="horz" lIns="91440" tIns="45720" rIns="91440" bIns="45720" rtlCol="0" anchor="t">
-            <a:normAutofit fontScale="92500"/>
+            <a:normAutofit lnSpcReduction="10000"/>
           </a:bodyPr>
           <a:lstStyle/>
           <a:p>
@@ -6585,7 +6600,7 @@
                 <a:ea typeface="Calibri"/>
                 <a:cs typeface="Calibri"/>
               </a:rPr>
-              <a:t> or other interview question database</a:t>
+              <a:t> or other interview question database.</a:t>
             </a:r>
           </a:p>
           <a:p>
@@ -6609,7 +6624,17 @@
                 <a:ea typeface="Calibri"/>
                 <a:cs typeface="Calibri"/>
               </a:rPr>
-              <a:t>Intermediate math problem (combinatorics, RSA key generator, calculus)</a:t>
+              <a:t>Intermediate math problem (combinatorics, RSA key generator, calculus).</a:t>
+            </a:r>
+          </a:p>
+          <a:p>
+            <a:pPr lvl="1"/>
+            <a:r>
+              <a:rPr lang="en-US" dirty="0">
+                <a:ea typeface="Calibri"/>
+                <a:cs typeface="Calibri"/>
+              </a:rPr>
+              <a:t>More examples forthcoming – stay tuned.</a:t>
             </a:r>
           </a:p>
           <a:p>

</xml_diff>